<commit_message>
adding updated slide deck and final report for capstone 1
</commit_message>
<xml_diff>
--- a/Capstone1/project1Writeups/Predicting Outcomes of NFL Contests.pptx
+++ b/Capstone1/project1Writeups/Predicting Outcomes of NFL Contests.pptx
@@ -11,6 +11,8 @@
     <p:sldId id="259" r:id="rId5"/>
     <p:sldId id="261" r:id="rId6"/>
     <p:sldId id="262" r:id="rId7"/>
+    <p:sldId id="263" r:id="rId8"/>
+    <p:sldId id="264" r:id="rId9"/>
   </p:sldIdLst>
   <p:sldSz cx="12192000" cy="6858000"/>
   <p:notesSz cx="6858000" cy="9144000"/>
@@ -571,7 +573,7 @@
           <a:p>
             <a:fld id="{DB78A697-9D75-4DE8-8C28-1296A6CF43C1}" type="datetimeFigureOut">
               <a:rPr lang="en-US" dirty="0"/>
-              <a:t>7/7/2019</a:t>
+              <a:t>7/29/2019</a:t>
             </a:fld>
             <a:endParaRPr lang="en-US" dirty="0"/>
           </a:p>
@@ -905,7 +907,7 @@
           <a:p>
             <a:fld id="{1CF3075A-B3CA-4308-8288-4AA3FDE33D80}" type="datetimeFigureOut">
               <a:rPr lang="en-US" dirty="0"/>
-              <a:t>7/7/2019</a:t>
+              <a:t>7/29/2019</a:t>
             </a:fld>
             <a:endParaRPr lang="en-US" dirty="0"/>
           </a:p>
@@ -1096,7 +1098,7 @@
           <a:p>
             <a:fld id="{2C674B8D-FEEF-4ACC-AE11-BD533592BCDC}" type="datetimeFigureOut">
               <a:rPr lang="en-US" dirty="0"/>
-              <a:t>7/7/2019</a:t>
+              <a:t>7/29/2019</a:t>
             </a:fld>
             <a:endParaRPr lang="en-US" dirty="0"/>
           </a:p>
@@ -1361,7 +1363,7 @@
           <a:p>
             <a:fld id="{80326006-7E0B-4944-9FC8-8FFECA54B11C}" type="datetimeFigureOut">
               <a:rPr lang="en-US" dirty="0"/>
-              <a:t>7/7/2019</a:t>
+              <a:t>7/29/2019</a:t>
             </a:fld>
             <a:endParaRPr lang="en-US" dirty="0"/>
           </a:p>
@@ -1784,7 +1786,7 @@
           <a:p>
             <a:fld id="{1B5A3413-B80B-4905-8668-7292F4C8B0D5}" type="datetimeFigureOut">
               <a:rPr lang="en-US" dirty="0"/>
-              <a:t>7/7/2019</a:t>
+              <a:t>7/29/2019</a:t>
             </a:fld>
             <a:endParaRPr lang="en-US" dirty="0"/>
           </a:p>
@@ -2329,7 +2331,7 @@
           <a:p>
             <a:fld id="{74019662-C6A4-45F9-A235-129F0C1DEF43}" type="datetimeFigureOut">
               <a:rPr lang="en-US" dirty="0"/>
-              <a:t>7/7/2019</a:t>
+              <a:t>7/29/2019</a:t>
             </a:fld>
             <a:endParaRPr lang="en-US" dirty="0"/>
           </a:p>
@@ -3114,7 +3116,7 @@
           <a:p>
             <a:fld id="{909BB764-976A-4040-BDCA-252C91CEE939}" type="datetimeFigureOut">
               <a:rPr lang="en-US" dirty="0"/>
-              <a:t>7/7/2019</a:t>
+              <a:t>7/29/2019</a:t>
             </a:fld>
             <a:endParaRPr lang="en-US" dirty="0"/>
           </a:p>
@@ -3288,7 +3290,7 @@
           <a:p>
             <a:fld id="{614FC935-CE77-4008-BAD9-6108F00BE393}" type="datetimeFigureOut">
               <a:rPr lang="en-US" dirty="0"/>
-              <a:t>7/7/2019</a:t>
+              <a:t>7/29/2019</a:t>
             </a:fld>
             <a:endParaRPr lang="en-US" dirty="0"/>
           </a:p>
@@ -3467,7 +3469,7 @@
           <a:p>
             <a:fld id="{94C562D5-4244-4B26-B385-E71032EABECD}" type="datetimeFigureOut">
               <a:rPr lang="en-US" dirty="0"/>
-              <a:t>7/7/2019</a:t>
+              <a:t>7/29/2019</a:t>
             </a:fld>
             <a:endParaRPr lang="en-US" dirty="0"/>
           </a:p>
@@ -3637,7 +3639,7 @@
           <a:p>
             <a:fld id="{06DBD967-1B7E-40AA-AAF7-BA98E0E039F7}" type="datetimeFigureOut">
               <a:rPr lang="en-US" dirty="0"/>
-              <a:t>7/7/2019</a:t>
+              <a:t>7/29/2019</a:t>
             </a:fld>
             <a:endParaRPr lang="en-US" dirty="0"/>
           </a:p>
@@ -3882,7 +3884,7 @@
           <a:p>
             <a:fld id="{B9D1490F-3E6A-4544-9694-22B6007FE3C6}" type="datetimeFigureOut">
               <a:rPr lang="en-US" dirty="0"/>
-              <a:t>7/7/2019</a:t>
+              <a:t>7/29/2019</a:t>
             </a:fld>
             <a:endParaRPr lang="en-US" dirty="0"/>
           </a:p>
@@ -4114,7 +4116,7 @@
           <a:p>
             <a:fld id="{EAAF9620-38BC-4982-922B-C904A70C41DD}" type="datetimeFigureOut">
               <a:rPr lang="en-US" dirty="0"/>
-              <a:t>7/7/2019</a:t>
+              <a:t>7/29/2019</a:t>
             </a:fld>
             <a:endParaRPr lang="en-US" dirty="0"/>
           </a:p>
@@ -4494,7 +4496,7 @@
           <a:p>
             <a:fld id="{32956FC6-E80E-40CB-B83C-A6FFE3EF0BA6}" type="datetimeFigureOut">
               <a:rPr lang="en-US" dirty="0"/>
-              <a:t>7/7/2019</a:t>
+              <a:t>7/29/2019</a:t>
             </a:fld>
             <a:endParaRPr lang="en-US" dirty="0"/>
           </a:p>
@@ -4607,7 +4609,7 @@
           <a:p>
             <a:fld id="{ECFF863F-52DC-41B2-9D00-5A4E5632AC32}" type="datetimeFigureOut">
               <a:rPr lang="en-US" dirty="0"/>
-              <a:t>7/7/2019</a:t>
+              <a:t>7/29/2019</a:t>
             </a:fld>
             <a:endParaRPr lang="en-US" dirty="0"/>
           </a:p>
@@ -4697,7 +4699,7 @@
           <a:p>
             <a:fld id="{B3B55614-3909-43DC-A067-7F9842F8B81D}" type="datetimeFigureOut">
               <a:rPr lang="en-US" dirty="0"/>
-              <a:t>7/7/2019</a:t>
+              <a:t>7/29/2019</a:t>
             </a:fld>
             <a:endParaRPr lang="en-US" dirty="0"/>
           </a:p>
@@ -4945,7 +4947,7 @@
           <a:p>
             <a:fld id="{62829323-6A73-409C-86A6-9EAF0F851121}" type="datetimeFigureOut">
               <a:rPr lang="en-US" dirty="0"/>
-              <a:t>7/7/2019</a:t>
+              <a:t>7/29/2019</a:t>
             </a:fld>
             <a:endParaRPr lang="en-US" dirty="0"/>
           </a:p>
@@ -5209,7 +5211,7 @@
           <a:p>
             <a:fld id="{0E240176-F1D3-49EC-82F4-0915A3AC4184}" type="datetimeFigureOut">
               <a:rPr lang="en-US" dirty="0"/>
-              <a:t>7/7/2019</a:t>
+              <a:t>7/29/2019</a:t>
             </a:fld>
             <a:endParaRPr lang="en-US" dirty="0"/>
           </a:p>
@@ -5608,7 +5610,7 @@
           <a:p>
             <a:fld id="{50172865-FBF0-458A-BAFF-4F75173770F5}" type="datetimeFigureOut">
               <a:rPr lang="en-US" dirty="0"/>
-              <a:t>7/7/2019</a:t>
+              <a:t>7/29/2019</a:t>
             </a:fld>
             <a:endParaRPr lang="en-US" dirty="0"/>
           </a:p>
@@ -6554,7 +6556,9 @@
         </p:nvSpPr>
         <p:spPr/>
         <p:txBody>
-          <a:bodyPr/>
+          <a:bodyPr>
+            <a:normAutofit lnSpcReduction="10000"/>
+          </a:bodyPr>
           <a:lstStyle/>
           <a:p>
             <a:r>
@@ -6760,11 +6764,7 @@
           <a:p>
             <a:r>
               <a:rPr lang="en-US" dirty="0" smtClean="0"/>
-              <a:t>Some dependent variables are highly correlated, but </a:t>
-            </a:r>
-            <a:r>
-              <a:rPr lang="en-US" smtClean="0"/>
-              <a:t>none exceed .77</a:t>
+              <a:t>Some dependent variables are highly correlated, but none exceed .77</a:t>
             </a:r>
             <a:endParaRPr lang="en-US" dirty="0"/>
           </a:p>
@@ -6774,6 +6774,247 @@
     <p:extLst>
       <p:ext uri="{BB962C8B-B14F-4D97-AF65-F5344CB8AC3E}">
         <p14:creationId xmlns:p14="http://schemas.microsoft.com/office/powerpoint/2010/main" val="865157187"/>
+      </p:ext>
+    </p:extLst>
+  </p:cSld>
+  <p:clrMapOvr>
+    <a:masterClrMapping/>
+  </p:clrMapOvr>
+</p:sld>
+</file>
+
+<file path=ppt/slides/slide7.xml><?xml version="1.0" encoding="utf-8"?>
+<p:sld xmlns:a="http://schemas.openxmlformats.org/drawingml/2006/main" xmlns:r="http://schemas.openxmlformats.org/officeDocument/2006/relationships" xmlns:p="http://schemas.openxmlformats.org/presentationml/2006/main">
+  <p:cSld>
+    <p:spTree>
+      <p:nvGrpSpPr>
+        <p:cNvPr id="1" name=""/>
+        <p:cNvGrpSpPr/>
+        <p:nvPr/>
+      </p:nvGrpSpPr>
+      <p:grpSpPr>
+        <a:xfrm>
+          <a:off x="0" y="0"/>
+          <a:ext cx="0" cy="0"/>
+          <a:chOff x="0" y="0"/>
+          <a:chExt cx="0" cy="0"/>
+        </a:xfrm>
+      </p:grpSpPr>
+      <p:sp>
+        <p:nvSpPr>
+          <p:cNvPr id="2" name="Title 1"/>
+          <p:cNvSpPr>
+            <a:spLocks noGrp="1"/>
+          </p:cNvSpPr>
+          <p:nvPr>
+            <p:ph type="title"/>
+          </p:nvPr>
+        </p:nvSpPr>
+        <p:spPr/>
+        <p:txBody>
+          <a:bodyPr/>
+          <a:lstStyle/>
+          <a:p>
+            <a:r>
+              <a:rPr lang="en-US" dirty="0" smtClean="0"/>
+              <a:t>Machine Learning</a:t>
+            </a:r>
+            <a:endParaRPr lang="en-US" dirty="0"/>
+          </a:p>
+        </p:txBody>
+      </p:sp>
+      <p:sp>
+        <p:nvSpPr>
+          <p:cNvPr id="3" name="Content Placeholder 2"/>
+          <p:cNvSpPr>
+            <a:spLocks noGrp="1"/>
+          </p:cNvSpPr>
+          <p:nvPr>
+            <p:ph sz="quarter" idx="13"/>
+          </p:nvPr>
+        </p:nvSpPr>
+        <p:spPr/>
+        <p:txBody>
+          <a:bodyPr/>
+          <a:lstStyle/>
+          <a:p>
+            <a:r>
+              <a:rPr lang="en-US" dirty="0" smtClean="0"/>
+              <a:t>Tried Multiple linear regression, random forests, </a:t>
+            </a:r>
+            <a:r>
+              <a:rPr lang="en-US" dirty="0" err="1" smtClean="0"/>
+              <a:t>XGBoost</a:t>
+            </a:r>
+            <a:endParaRPr lang="en-US" dirty="0" smtClean="0"/>
+          </a:p>
+          <a:p>
+            <a:r>
+              <a:rPr lang="en-US" dirty="0" smtClean="0"/>
+              <a:t>MLR performed best</a:t>
+            </a:r>
+          </a:p>
+          <a:p>
+            <a:pPr lvl="1"/>
+            <a:r>
+              <a:rPr lang="en-US" dirty="0" smtClean="0"/>
+              <a:t>5-point overs rule has a 60.8% win rate</a:t>
+            </a:r>
+          </a:p>
+          <a:p>
+            <a:pPr lvl="1"/>
+            <a:r>
+              <a:rPr lang="en-US" dirty="0" smtClean="0"/>
+              <a:t>Roughly one recommendation per week</a:t>
+            </a:r>
+          </a:p>
+          <a:p>
+            <a:pPr lvl="1"/>
+            <a:r>
+              <a:rPr lang="en-US" dirty="0" smtClean="0"/>
+              <a:t>8.4% ROI using this system</a:t>
+            </a:r>
+          </a:p>
+          <a:p>
+            <a:endParaRPr lang="en-US" dirty="0"/>
+          </a:p>
+        </p:txBody>
+      </p:sp>
+      <p:pic>
+        <p:nvPicPr>
+          <p:cNvPr id="4" name="Picture 3" descr="https://lh4.googleusercontent.com/3tEMG0MSQj_vEADQOSGmToq9p3tJ22t60rkCuxablNbyd6aBKJhzc76OmaKufw8ebNlPIA_TUQhxs1ZI1CBc_47pb_XlQvLLYfr_WLyzgub5o3jkMRsyFT4eNiHIyPTuD2U08SHW"/>
+          <p:cNvPicPr/>
+          <p:nvPr/>
+        </p:nvPicPr>
+        <p:blipFill rotWithShape="1">
+          <a:blip r:embed="rId2">
+            <a:extLst>
+              <a:ext uri="{28A0092B-C50C-407E-A947-70E740481C1C}">
+                <a14:useLocalDpi xmlns:a14="http://schemas.microsoft.com/office/drawing/2010/main" val="0"/>
+              </a:ext>
+            </a:extLst>
+          </a:blip>
+          <a:srcRect l="5363" t="24940" r="78364" b="20046"/>
+          <a:stretch/>
+        </p:blipFill>
+        <p:spPr bwMode="auto">
+          <a:xfrm>
+            <a:off x="7727092" y="685800"/>
+            <a:ext cx="3353415" cy="4688785"/>
+          </a:xfrm>
+          <a:prstGeom prst="rect">
+            <a:avLst/>
+          </a:prstGeom>
+          <a:noFill/>
+          <a:ln>
+            <a:noFill/>
+          </a:ln>
+          <a:extLst>
+            <a:ext uri="{53640926-AAD7-44D8-BBD7-CCE9431645EC}">
+              <a14:shadowObscured xmlns:a14="http://schemas.microsoft.com/office/drawing/2010/main"/>
+            </a:ext>
+          </a:extLst>
+        </p:spPr>
+      </p:pic>
+    </p:spTree>
+    <p:extLst>
+      <p:ext uri="{BB962C8B-B14F-4D97-AF65-F5344CB8AC3E}">
+        <p14:creationId xmlns:p14="http://schemas.microsoft.com/office/powerpoint/2010/main" val="1777587205"/>
+      </p:ext>
+    </p:extLst>
+  </p:cSld>
+  <p:clrMapOvr>
+    <a:masterClrMapping/>
+  </p:clrMapOvr>
+</p:sld>
+</file>
+
+<file path=ppt/slides/slide8.xml><?xml version="1.0" encoding="utf-8"?>
+<p:sld xmlns:a="http://schemas.openxmlformats.org/drawingml/2006/main" xmlns:r="http://schemas.openxmlformats.org/officeDocument/2006/relationships" xmlns:p="http://schemas.openxmlformats.org/presentationml/2006/main">
+  <p:cSld>
+    <p:spTree>
+      <p:nvGrpSpPr>
+        <p:cNvPr id="1" name=""/>
+        <p:cNvGrpSpPr/>
+        <p:nvPr/>
+      </p:nvGrpSpPr>
+      <p:grpSpPr>
+        <a:xfrm>
+          <a:off x="0" y="0"/>
+          <a:ext cx="0" cy="0"/>
+          <a:chOff x="0" y="0"/>
+          <a:chExt cx="0" cy="0"/>
+        </a:xfrm>
+      </p:grpSpPr>
+      <p:sp>
+        <p:nvSpPr>
+          <p:cNvPr id="2" name="Title 1"/>
+          <p:cNvSpPr>
+            <a:spLocks noGrp="1"/>
+          </p:cNvSpPr>
+          <p:nvPr>
+            <p:ph type="title"/>
+          </p:nvPr>
+        </p:nvSpPr>
+        <p:spPr/>
+        <p:txBody>
+          <a:bodyPr/>
+          <a:lstStyle/>
+          <a:p>
+            <a:r>
+              <a:rPr lang="en-US" dirty="0" smtClean="0"/>
+              <a:t>Next steps/Future Work</a:t>
+            </a:r>
+            <a:endParaRPr lang="en-US" dirty="0"/>
+          </a:p>
+        </p:txBody>
+      </p:sp>
+      <p:sp>
+        <p:nvSpPr>
+          <p:cNvPr id="3" name="Content Placeholder 2"/>
+          <p:cNvSpPr>
+            <a:spLocks noGrp="1"/>
+          </p:cNvSpPr>
+          <p:nvPr>
+            <p:ph sz="quarter" idx="13"/>
+          </p:nvPr>
+        </p:nvSpPr>
+        <p:spPr/>
+        <p:txBody>
+          <a:bodyPr/>
+          <a:lstStyle/>
+          <a:p>
+            <a:r>
+              <a:rPr lang="en-US" dirty="0" smtClean="0"/>
+              <a:t>Collect and implement additional data into models</a:t>
+            </a:r>
+          </a:p>
+          <a:p>
+            <a:pPr lvl="1"/>
+            <a:r>
+              <a:rPr lang="en-US" dirty="0" smtClean="0"/>
+              <a:t>In-game statistics, such as pass yards per game</a:t>
+            </a:r>
+          </a:p>
+          <a:p>
+            <a:r>
+              <a:rPr lang="en-US" dirty="0" smtClean="0"/>
+              <a:t>Try additional algorithms</a:t>
+            </a:r>
+          </a:p>
+          <a:p>
+            <a:r>
+              <a:rPr lang="en-US" dirty="0" smtClean="0"/>
+              <a:t>Pitch results to clients, friends, sportsbooks</a:t>
+            </a:r>
+            <a:endParaRPr lang="en-US" dirty="0"/>
+          </a:p>
+        </p:txBody>
+      </p:sp>
+    </p:spTree>
+    <p:extLst>
+      <p:ext uri="{BB962C8B-B14F-4D97-AF65-F5344CB8AC3E}">
+        <p14:creationId xmlns:p14="http://schemas.microsoft.com/office/powerpoint/2010/main" val="2001840365"/>
       </p:ext>
     </p:extLst>
   </p:cSld>

</xml_diff>

<commit_message>
Changes to capstone 1 and 2 final reports
</commit_message>
<xml_diff>
--- a/Capstone1/project1Writeups/Predicting Outcomes of NFL Contests.pptx
+++ b/Capstone1/project1Writeups/Predicting Outcomes of NFL Contests.pptx
@@ -12,7 +12,8 @@
     <p:sldId id="261" r:id="rId6"/>
     <p:sldId id="262" r:id="rId7"/>
     <p:sldId id="263" r:id="rId8"/>
-    <p:sldId id="264" r:id="rId9"/>
+    <p:sldId id="265" r:id="rId9"/>
+    <p:sldId id="264" r:id="rId10"/>
   </p:sldIdLst>
   <p:sldSz cx="12192000" cy="6858000"/>
   <p:notesSz cx="6858000" cy="9144000"/>
@@ -573,7 +574,7 @@
           <a:p>
             <a:fld id="{DB78A697-9D75-4DE8-8C28-1296A6CF43C1}" type="datetimeFigureOut">
               <a:rPr lang="en-US" dirty="0"/>
-              <a:t>7/29/2019</a:t>
+              <a:t>6/11/2020</a:t>
             </a:fld>
             <a:endParaRPr lang="en-US" dirty="0"/>
           </a:p>
@@ -907,7 +908,7 @@
           <a:p>
             <a:fld id="{1CF3075A-B3CA-4308-8288-4AA3FDE33D80}" type="datetimeFigureOut">
               <a:rPr lang="en-US" dirty="0"/>
-              <a:t>7/29/2019</a:t>
+              <a:t>6/11/2020</a:t>
             </a:fld>
             <a:endParaRPr lang="en-US" dirty="0"/>
           </a:p>
@@ -1098,7 +1099,7 @@
           <a:p>
             <a:fld id="{2C674B8D-FEEF-4ACC-AE11-BD533592BCDC}" type="datetimeFigureOut">
               <a:rPr lang="en-US" dirty="0"/>
-              <a:t>7/29/2019</a:t>
+              <a:t>6/11/2020</a:t>
             </a:fld>
             <a:endParaRPr lang="en-US" dirty="0"/>
           </a:p>
@@ -1363,7 +1364,7 @@
           <a:p>
             <a:fld id="{80326006-7E0B-4944-9FC8-8FFECA54B11C}" type="datetimeFigureOut">
               <a:rPr lang="en-US" dirty="0"/>
-              <a:t>7/29/2019</a:t>
+              <a:t>6/11/2020</a:t>
             </a:fld>
             <a:endParaRPr lang="en-US" dirty="0"/>
           </a:p>
@@ -1786,7 +1787,7 @@
           <a:p>
             <a:fld id="{1B5A3413-B80B-4905-8668-7292F4C8B0D5}" type="datetimeFigureOut">
               <a:rPr lang="en-US" dirty="0"/>
-              <a:t>7/29/2019</a:t>
+              <a:t>6/11/2020</a:t>
             </a:fld>
             <a:endParaRPr lang="en-US" dirty="0"/>
           </a:p>
@@ -2331,7 +2332,7 @@
           <a:p>
             <a:fld id="{74019662-C6A4-45F9-A235-129F0C1DEF43}" type="datetimeFigureOut">
               <a:rPr lang="en-US" dirty="0"/>
-              <a:t>7/29/2019</a:t>
+              <a:t>6/11/2020</a:t>
             </a:fld>
             <a:endParaRPr lang="en-US" dirty="0"/>
           </a:p>
@@ -3116,7 +3117,7 @@
           <a:p>
             <a:fld id="{909BB764-976A-4040-BDCA-252C91CEE939}" type="datetimeFigureOut">
               <a:rPr lang="en-US" dirty="0"/>
-              <a:t>7/29/2019</a:t>
+              <a:t>6/11/2020</a:t>
             </a:fld>
             <a:endParaRPr lang="en-US" dirty="0"/>
           </a:p>
@@ -3290,7 +3291,7 @@
           <a:p>
             <a:fld id="{614FC935-CE77-4008-BAD9-6108F00BE393}" type="datetimeFigureOut">
               <a:rPr lang="en-US" dirty="0"/>
-              <a:t>7/29/2019</a:t>
+              <a:t>6/11/2020</a:t>
             </a:fld>
             <a:endParaRPr lang="en-US" dirty="0"/>
           </a:p>
@@ -3469,7 +3470,7 @@
           <a:p>
             <a:fld id="{94C562D5-4244-4B26-B385-E71032EABECD}" type="datetimeFigureOut">
               <a:rPr lang="en-US" dirty="0"/>
-              <a:t>7/29/2019</a:t>
+              <a:t>6/11/2020</a:t>
             </a:fld>
             <a:endParaRPr lang="en-US" dirty="0"/>
           </a:p>
@@ -3639,7 +3640,7 @@
           <a:p>
             <a:fld id="{06DBD967-1B7E-40AA-AAF7-BA98E0E039F7}" type="datetimeFigureOut">
               <a:rPr lang="en-US" dirty="0"/>
-              <a:t>7/29/2019</a:t>
+              <a:t>6/11/2020</a:t>
             </a:fld>
             <a:endParaRPr lang="en-US" dirty="0"/>
           </a:p>
@@ -3884,7 +3885,7 @@
           <a:p>
             <a:fld id="{B9D1490F-3E6A-4544-9694-22B6007FE3C6}" type="datetimeFigureOut">
               <a:rPr lang="en-US" dirty="0"/>
-              <a:t>7/29/2019</a:t>
+              <a:t>6/11/2020</a:t>
             </a:fld>
             <a:endParaRPr lang="en-US" dirty="0"/>
           </a:p>
@@ -4116,7 +4117,7 @@
           <a:p>
             <a:fld id="{EAAF9620-38BC-4982-922B-C904A70C41DD}" type="datetimeFigureOut">
               <a:rPr lang="en-US" dirty="0"/>
-              <a:t>7/29/2019</a:t>
+              <a:t>6/11/2020</a:t>
             </a:fld>
             <a:endParaRPr lang="en-US" dirty="0"/>
           </a:p>
@@ -4496,7 +4497,7 @@
           <a:p>
             <a:fld id="{32956FC6-E80E-40CB-B83C-A6FFE3EF0BA6}" type="datetimeFigureOut">
               <a:rPr lang="en-US" dirty="0"/>
-              <a:t>7/29/2019</a:t>
+              <a:t>6/11/2020</a:t>
             </a:fld>
             <a:endParaRPr lang="en-US" dirty="0"/>
           </a:p>
@@ -4609,7 +4610,7 @@
           <a:p>
             <a:fld id="{ECFF863F-52DC-41B2-9D00-5A4E5632AC32}" type="datetimeFigureOut">
               <a:rPr lang="en-US" dirty="0"/>
-              <a:t>7/29/2019</a:t>
+              <a:t>6/11/2020</a:t>
             </a:fld>
             <a:endParaRPr lang="en-US" dirty="0"/>
           </a:p>
@@ -4699,7 +4700,7 @@
           <a:p>
             <a:fld id="{B3B55614-3909-43DC-A067-7F9842F8B81D}" type="datetimeFigureOut">
               <a:rPr lang="en-US" dirty="0"/>
-              <a:t>7/29/2019</a:t>
+              <a:t>6/11/2020</a:t>
             </a:fld>
             <a:endParaRPr lang="en-US" dirty="0"/>
           </a:p>
@@ -4947,7 +4948,7 @@
           <a:p>
             <a:fld id="{62829323-6A73-409C-86A6-9EAF0F851121}" type="datetimeFigureOut">
               <a:rPr lang="en-US" dirty="0"/>
-              <a:t>7/29/2019</a:t>
+              <a:t>6/11/2020</a:t>
             </a:fld>
             <a:endParaRPr lang="en-US" dirty="0"/>
           </a:p>
@@ -5211,7 +5212,7 @@
           <a:p>
             <a:fld id="{0E240176-F1D3-49EC-82F4-0915A3AC4184}" type="datetimeFigureOut">
               <a:rPr lang="en-US" dirty="0"/>
-              <a:t>7/29/2019</a:t>
+              <a:t>6/11/2020</a:t>
             </a:fld>
             <a:endParaRPr lang="en-US" dirty="0"/>
           </a:p>
@@ -5610,7 +5611,7 @@
           <a:p>
             <a:fld id="{50172865-FBF0-458A-BAFF-4F75173770F5}" type="datetimeFigureOut">
               <a:rPr lang="en-US" dirty="0"/>
-              <a:t>7/29/2019</a:t>
+              <a:t>6/11/2020</a:t>
             </a:fld>
             <a:endParaRPr lang="en-US" dirty="0"/>
           </a:p>
@@ -6956,6 +6957,95 @@
             <p:ph type="title"/>
           </p:nvPr>
         </p:nvSpPr>
+        <p:spPr>
+          <a:xfrm>
+            <a:off x="685801" y="166089"/>
+            <a:ext cx="10396882" cy="1151965"/>
+          </a:xfrm>
+        </p:spPr>
+        <p:txBody>
+          <a:bodyPr>
+            <a:normAutofit/>
+          </a:bodyPr>
+          <a:lstStyle/>
+          <a:p>
+            <a:r>
+              <a:rPr lang="en-US" dirty="0" smtClean="0"/>
+              <a:t>ROI</a:t>
+            </a:r>
+            <a:endParaRPr lang="en-US" dirty="0"/>
+          </a:p>
+        </p:txBody>
+      </p:sp>
+      <p:pic>
+        <p:nvPicPr>
+          <p:cNvPr id="4" name="Content Placeholder 3"/>
+          <p:cNvPicPr>
+            <a:picLocks noGrp="1" noChangeAspect="1"/>
+          </p:cNvPicPr>
+          <p:nvPr>
+            <p:ph sz="quarter" idx="13"/>
+          </p:nvPr>
+        </p:nvPicPr>
+        <p:blipFill>
+          <a:blip r:embed="rId2">
+            <a:extLst>
+              <a:ext uri="{28A0092B-C50C-407E-A947-70E740481C1C}">
+                <a14:useLocalDpi xmlns:a14="http://schemas.microsoft.com/office/drawing/2010/main" val="0"/>
+              </a:ext>
+            </a:extLst>
+          </a:blip>
+          <a:stretch>
+            <a:fillRect/>
+          </a:stretch>
+        </p:blipFill>
+        <p:spPr>
+          <a:xfrm>
+            <a:off x="790832" y="1318054"/>
+            <a:ext cx="10453817" cy="4580238"/>
+          </a:xfrm>
+        </p:spPr>
+      </p:pic>
+    </p:spTree>
+    <p:extLst>
+      <p:ext uri="{BB962C8B-B14F-4D97-AF65-F5344CB8AC3E}">
+        <p14:creationId xmlns:p14="http://schemas.microsoft.com/office/powerpoint/2010/main" val="301810847"/>
+      </p:ext>
+    </p:extLst>
+  </p:cSld>
+  <p:clrMapOvr>
+    <a:masterClrMapping/>
+  </p:clrMapOvr>
+</p:sld>
+</file>
+
+<file path=ppt/slides/slide9.xml><?xml version="1.0" encoding="utf-8"?>
+<p:sld xmlns:a="http://schemas.openxmlformats.org/drawingml/2006/main" xmlns:r="http://schemas.openxmlformats.org/officeDocument/2006/relationships" xmlns:p="http://schemas.openxmlformats.org/presentationml/2006/main">
+  <p:cSld>
+    <p:spTree>
+      <p:nvGrpSpPr>
+        <p:cNvPr id="1" name=""/>
+        <p:cNvGrpSpPr/>
+        <p:nvPr/>
+      </p:nvGrpSpPr>
+      <p:grpSpPr>
+        <a:xfrm>
+          <a:off x="0" y="0"/>
+          <a:ext cx="0" cy="0"/>
+          <a:chOff x="0" y="0"/>
+          <a:chExt cx="0" cy="0"/>
+        </a:xfrm>
+      </p:grpSpPr>
+      <p:sp>
+        <p:nvSpPr>
+          <p:cNvPr id="2" name="Title 1"/>
+          <p:cNvSpPr>
+            <a:spLocks noGrp="1"/>
+          </p:cNvSpPr>
+          <p:nvPr>
+            <p:ph type="title"/>
+          </p:nvPr>
+        </p:nvSpPr>
         <p:spPr/>
         <p:txBody>
           <a:bodyPr/>

</xml_diff>